<commit_message>
Almost done with the final few more changes
</commit_message>
<xml_diff>
--- a/Game map.pptx
+++ b/Game map.pptx
@@ -288,7 +288,7 @@
           <a:p>
             <a:fld id="{68EEB92A-1354-7345-8477-29C206D09428}" type="datetimeFigureOut">
               <a:rPr lang="en-US" smtClean="0"/>
-              <a:t>11/6/12</a:t>
+              <a:t>12/8/12</a:t>
             </a:fld>
             <a:endParaRPr lang="en-US"/>
           </a:p>
@@ -458,7 +458,7 @@
           <a:p>
             <a:fld id="{68EEB92A-1354-7345-8477-29C206D09428}" type="datetimeFigureOut">
               <a:rPr lang="en-US" smtClean="0"/>
-              <a:t>11/6/12</a:t>
+              <a:t>12/8/12</a:t>
             </a:fld>
             <a:endParaRPr lang="en-US"/>
           </a:p>
@@ -638,7 +638,7 @@
           <a:p>
             <a:fld id="{68EEB92A-1354-7345-8477-29C206D09428}" type="datetimeFigureOut">
               <a:rPr lang="en-US" smtClean="0"/>
-              <a:t>11/6/12</a:t>
+              <a:t>12/8/12</a:t>
             </a:fld>
             <a:endParaRPr lang="en-US"/>
           </a:p>
@@ -808,7 +808,7 @@
           <a:p>
             <a:fld id="{68EEB92A-1354-7345-8477-29C206D09428}" type="datetimeFigureOut">
               <a:rPr lang="en-US" smtClean="0"/>
-              <a:t>11/6/12</a:t>
+              <a:t>12/8/12</a:t>
             </a:fld>
             <a:endParaRPr lang="en-US"/>
           </a:p>
@@ -1054,7 +1054,7 @@
           <a:p>
             <a:fld id="{68EEB92A-1354-7345-8477-29C206D09428}" type="datetimeFigureOut">
               <a:rPr lang="en-US" smtClean="0"/>
-              <a:t>11/6/12</a:t>
+              <a:t>12/8/12</a:t>
             </a:fld>
             <a:endParaRPr lang="en-US"/>
           </a:p>
@@ -1342,7 +1342,7 @@
           <a:p>
             <a:fld id="{68EEB92A-1354-7345-8477-29C206D09428}" type="datetimeFigureOut">
               <a:rPr lang="en-US" smtClean="0"/>
-              <a:t>11/6/12</a:t>
+              <a:t>12/8/12</a:t>
             </a:fld>
             <a:endParaRPr lang="en-US"/>
           </a:p>
@@ -1764,7 +1764,7 @@
           <a:p>
             <a:fld id="{68EEB92A-1354-7345-8477-29C206D09428}" type="datetimeFigureOut">
               <a:rPr lang="en-US" smtClean="0"/>
-              <a:t>11/6/12</a:t>
+              <a:t>12/8/12</a:t>
             </a:fld>
             <a:endParaRPr lang="en-US"/>
           </a:p>
@@ -1882,7 +1882,7 @@
           <a:p>
             <a:fld id="{68EEB92A-1354-7345-8477-29C206D09428}" type="datetimeFigureOut">
               <a:rPr lang="en-US" smtClean="0"/>
-              <a:t>11/6/12</a:t>
+              <a:t>12/8/12</a:t>
             </a:fld>
             <a:endParaRPr lang="en-US"/>
           </a:p>
@@ -1977,7 +1977,7 @@
           <a:p>
             <a:fld id="{68EEB92A-1354-7345-8477-29C206D09428}" type="datetimeFigureOut">
               <a:rPr lang="en-US" smtClean="0"/>
-              <a:t>11/6/12</a:t>
+              <a:t>12/8/12</a:t>
             </a:fld>
             <a:endParaRPr lang="en-US"/>
           </a:p>
@@ -2254,7 +2254,7 @@
           <a:p>
             <a:fld id="{68EEB92A-1354-7345-8477-29C206D09428}" type="datetimeFigureOut">
               <a:rPr lang="en-US" smtClean="0"/>
-              <a:t>11/6/12</a:t>
+              <a:t>12/8/12</a:t>
             </a:fld>
             <a:endParaRPr lang="en-US"/>
           </a:p>
@@ -2507,7 +2507,7 @@
           <a:p>
             <a:fld id="{68EEB92A-1354-7345-8477-29C206D09428}" type="datetimeFigureOut">
               <a:rPr lang="en-US" smtClean="0"/>
-              <a:t>11/6/12</a:t>
+              <a:t>12/8/12</a:t>
             </a:fld>
             <a:endParaRPr lang="en-US"/>
           </a:p>
@@ -2720,7 +2720,7 @@
           <a:p>
             <a:fld id="{68EEB92A-1354-7345-8477-29C206D09428}" type="datetimeFigureOut">
               <a:rPr lang="en-US" smtClean="0"/>
-              <a:t>11/6/12</a:t>
+              <a:t>12/8/12</a:t>
             </a:fld>
             <a:endParaRPr lang="en-US"/>
           </a:p>
@@ -3192,7 +3192,7 @@
         </p:nvSpPr>
         <p:spPr>
           <a:xfrm>
-            <a:off x="5954418" y="3912632"/>
+            <a:off x="5954418" y="3738880"/>
             <a:ext cx="777301" cy="369332"/>
           </a:xfrm>
           <a:prstGeom prst="rect">
@@ -3365,6 +3365,144 @@
           </a:prstGeom>
         </p:spPr>
       </p:pic>
+      <p:cxnSp>
+        <p:nvCxnSpPr>
+          <p:cNvPr id="3" name="Straight Connector 2"/>
+          <p:cNvCxnSpPr/>
+          <p:nvPr/>
+        </p:nvCxnSpPr>
+        <p:spPr>
+          <a:xfrm flipV="1">
+            <a:off x="6290119" y="3912632"/>
+            <a:ext cx="1354504" cy="576997"/>
+          </a:xfrm>
+          <a:prstGeom prst="line">
+            <a:avLst/>
+          </a:prstGeom>
+          <a:ln>
+            <a:solidFill>
+              <a:schemeClr val="tx1"/>
+            </a:solidFill>
+          </a:ln>
+        </p:spPr>
+        <p:style>
+          <a:lnRef idx="2">
+            <a:schemeClr val="accent1"/>
+          </a:lnRef>
+          <a:fillRef idx="0">
+            <a:schemeClr val="accent1"/>
+          </a:fillRef>
+          <a:effectRef idx="1">
+            <a:schemeClr val="accent1"/>
+          </a:effectRef>
+          <a:fontRef idx="minor">
+            <a:schemeClr val="tx1"/>
+          </a:fontRef>
+        </p:style>
+      </p:cxnSp>
+      <p:cxnSp>
+        <p:nvCxnSpPr>
+          <p:cNvPr id="13" name="Straight Connector 12"/>
+          <p:cNvCxnSpPr/>
+          <p:nvPr/>
+        </p:nvCxnSpPr>
+        <p:spPr>
+          <a:xfrm flipV="1">
+            <a:off x="7644623" y="2879637"/>
+            <a:ext cx="716683" cy="1032995"/>
+          </a:xfrm>
+          <a:prstGeom prst="line">
+            <a:avLst/>
+          </a:prstGeom>
+          <a:ln>
+            <a:solidFill>
+              <a:schemeClr val="tx1"/>
+            </a:solidFill>
+          </a:ln>
+        </p:spPr>
+        <p:style>
+          <a:lnRef idx="2">
+            <a:schemeClr val="accent1"/>
+          </a:lnRef>
+          <a:fillRef idx="0">
+            <a:schemeClr val="accent1"/>
+          </a:fillRef>
+          <a:effectRef idx="1">
+            <a:schemeClr val="accent1"/>
+          </a:effectRef>
+          <a:fontRef idx="minor">
+            <a:schemeClr val="tx1"/>
+          </a:fontRef>
+        </p:style>
+      </p:cxnSp>
+      <p:sp>
+        <p:nvSpPr>
+          <p:cNvPr id="16" name="Rectangle 15"/>
+          <p:cNvSpPr/>
+          <p:nvPr/>
+        </p:nvSpPr>
+        <p:spPr>
+          <a:xfrm>
+            <a:off x="7529340" y="3878470"/>
+            <a:ext cx="831966" cy="369332"/>
+          </a:xfrm>
+          <a:prstGeom prst="rect">
+            <a:avLst/>
+          </a:prstGeom>
+        </p:spPr>
+        <p:txBody>
+          <a:bodyPr wrap="none">
+            <a:spAutoFit/>
+          </a:bodyPr>
+          <a:lstStyle/>
+          <a:p>
+            <a:r>
+              <a:rPr lang="en-US" dirty="0" smtClean="0"/>
+              <a:t>Escape</a:t>
+            </a:r>
+            <a:r>
+              <a:rPr lang="en-US" dirty="0" smtClean="0"/>
+              <a:t> </a:t>
+            </a:r>
+            <a:endParaRPr lang="en-US" dirty="0"/>
+          </a:p>
+        </p:txBody>
+      </p:sp>
+      <p:cxnSp>
+        <p:nvCxnSpPr>
+          <p:cNvPr id="17" name="Straight Connector 16"/>
+          <p:cNvCxnSpPr/>
+          <p:nvPr/>
+        </p:nvCxnSpPr>
+        <p:spPr>
+          <a:xfrm flipH="1" flipV="1">
+            <a:off x="6135816" y="4281964"/>
+            <a:ext cx="123402" cy="207665"/>
+          </a:xfrm>
+          <a:prstGeom prst="line">
+            <a:avLst/>
+          </a:prstGeom>
+          <a:ln>
+            <a:solidFill>
+              <a:schemeClr val="tx1"/>
+            </a:solidFill>
+          </a:ln>
+        </p:spPr>
+        <p:style>
+          <a:lnRef idx="2">
+            <a:schemeClr val="accent1"/>
+          </a:lnRef>
+          <a:fillRef idx="0">
+            <a:schemeClr val="accent1"/>
+          </a:fillRef>
+          <a:effectRef idx="1">
+            <a:schemeClr val="accent1"/>
+          </a:effectRef>
+          <a:fontRef idx="minor">
+            <a:schemeClr val="tx1"/>
+          </a:fontRef>
+        </p:style>
+      </p:cxnSp>
     </p:spTree>
     <p:extLst>
       <p:ext uri="{BB962C8B-B14F-4D97-AF65-F5344CB8AC3E}">

</xml_diff>